<commit_message>
added line break to slide
</commit_message>
<xml_diff>
--- a/PASS_SQLSaturday_PowerPoint.pptx
+++ b/PASS_SQLSaturday_PowerPoint.pptx
@@ -1900,7 +1900,7 @@
           <a:graphicData uri="http://schemas.openxmlformats.org/presentationml/2006/ole">
             <mc:AlternateContent xmlns:mc="http://schemas.openxmlformats.org/markup-compatibility/2006">
               <mc:Choice xmlns:v="urn:schemas-microsoft-com:vml" Requires="v">
-                <p:oleObj spid="_x0000_s1035" name="Image" r:id="rId10" imgW="2279520" imgH="1310400" progId="Photoshop.Image.18">
+                <p:oleObj spid="_x0000_s1036" name="Image" r:id="rId10" imgW="2279520" imgH="1310400" progId="Photoshop.Image.18">
                   <p:embed/>
                 </p:oleObj>
               </mc:Choice>
@@ -4150,8 +4150,19 @@
           <a:lstStyle/>
           <a:p>
             <a:r>
+              <a:rPr lang="en-US" smtClean="0"/>
+              <a:t>Processes </a:t>
+            </a:r>
+            <a:br>
+              <a:rPr lang="en-US" smtClean="0"/>
+            </a:br>
+            <a:r>
+              <a:rPr lang="en-US" smtClean="0"/>
+              <a:t>&amp; </a:t>
+            </a:r>
+            <a:r>
               <a:rPr lang="en-US" dirty="0" smtClean="0"/>
-              <a:t>Processes &amp; Threads</a:t>
+              <a:t>Threads</a:t>
             </a:r>
             <a:endParaRPr lang="en-US" dirty="0"/>
           </a:p>

</xml_diff>

<commit_message>
Moving code to text files to be worked during session
</commit_message>
<xml_diff>
--- a/PASS_SQLSaturday_PowerPoint.pptx
+++ b/PASS_SQLSaturday_PowerPoint.pptx
@@ -5,7 +5,7 @@
     <p:sldMasterId id="2147483648" r:id="rId1"/>
   </p:sldMasterIdLst>
   <p:notesMasterIdLst>
-    <p:notesMasterId r:id="rId23"/>
+    <p:notesMasterId r:id="rId24"/>
   </p:notesMasterIdLst>
   <p:sldIdLst>
     <p:sldId id="263" r:id="rId2"/>
@@ -23,12 +23,13 @@
     <p:sldId id="266" r:id="rId14"/>
     <p:sldId id="264" r:id="rId15"/>
     <p:sldId id="274" r:id="rId16"/>
-    <p:sldId id="275" r:id="rId17"/>
-    <p:sldId id="269" r:id="rId18"/>
-    <p:sldId id="276" r:id="rId19"/>
-    <p:sldId id="277" r:id="rId20"/>
-    <p:sldId id="261" r:id="rId21"/>
-    <p:sldId id="278" r:id="rId22"/>
+    <p:sldId id="279" r:id="rId17"/>
+    <p:sldId id="275" r:id="rId18"/>
+    <p:sldId id="269" r:id="rId19"/>
+    <p:sldId id="276" r:id="rId20"/>
+    <p:sldId id="277" r:id="rId21"/>
+    <p:sldId id="261" r:id="rId22"/>
+    <p:sldId id="278" r:id="rId23"/>
   </p:sldIdLst>
   <p:sldSz cx="11520488" cy="6480175"/>
   <p:notesSz cx="6858000" cy="9144000"/>
@@ -228,7 +229,7 @@
           <a:p>
             <a:fld id="{318C5791-7A92-4EF1-8641-2F2B233A696C}" type="datetimeFigureOut">
               <a:rPr lang="en-US" smtClean="0"/>
-              <a:t>7/27/2017</a:t>
+              <a:t>7/29/2017</a:t>
             </a:fld>
             <a:endParaRPr lang="en-US"/>
           </a:p>
@@ -822,10 +823,50 @@
           <a:p>
             <a:r>
               <a:rPr lang="en-US" dirty="0" smtClean="0"/>
-              <a:t>https://msdn.microsoft.com/en-us/magazine/dn802603.aspx</a:t>
-            </a:r>
-          </a:p>
-          <a:p>
+              <a:t>https://</a:t>
+            </a:r>
+            <a:r>
+              <a:rPr lang="en-US" dirty="0" smtClean="0"/>
+              <a:t>msdn.microsoft.com/en-us/magazine/dn802603.aspx</a:t>
+            </a:r>
+          </a:p>
+          <a:p>
+            <a:r>
+              <a:rPr lang="en-US" sz="1200" b="0" i="0" kern="1200" dirty="0" smtClean="0">
+                <a:solidFill>
+                  <a:schemeClr val="tx1"/>
+                </a:solidFill>
+                <a:effectLst/>
+                <a:latin typeface="+mn-lt"/>
+                <a:ea typeface="+mn-ea"/>
+                <a:cs typeface="+mn-cs"/>
+              </a:rPr>
+              <a:t>asynchronous code make better use of the managed thread  pool by allowing idle threads to be re-used that might otherwise be blocked – which greatly improves </a:t>
+            </a:r>
+            <a:r>
+              <a:rPr lang="en-US" sz="1200" b="0" i="1" u="sng" kern="1200" dirty="0" smtClean="0">
+                <a:solidFill>
+                  <a:schemeClr val="tx1"/>
+                </a:solidFill>
+                <a:effectLst/>
+                <a:latin typeface="+mn-lt"/>
+                <a:ea typeface="+mn-ea"/>
+                <a:cs typeface="+mn-cs"/>
+              </a:rPr>
+              <a:t>scalability</a:t>
+            </a:r>
+            <a:r>
+              <a:rPr lang="en-US" sz="1200" b="0" i="0" kern="1200" dirty="0" smtClean="0">
+                <a:solidFill>
+                  <a:schemeClr val="tx1"/>
+                </a:solidFill>
+                <a:effectLst/>
+                <a:latin typeface="+mn-lt"/>
+                <a:ea typeface="+mn-ea"/>
+                <a:cs typeface="+mn-cs"/>
+              </a:rPr>
+              <a:t>.</a:t>
+            </a:r>
             <a:endParaRPr lang="en-US" dirty="0"/>
           </a:p>
         </p:txBody>
@@ -857,6 +898,118 @@
     <p:extLst>
       <p:ext uri="{BB962C8B-B14F-4D97-AF65-F5344CB8AC3E}">
         <p14:creationId xmlns:p14="http://schemas.microsoft.com/office/powerpoint/2010/main" val="1757410593"/>
+      </p:ext>
+    </p:extLst>
+  </p:cSld>
+  <p:clrMapOvr>
+    <a:masterClrMapping/>
+  </p:clrMapOvr>
+</p:notes>
+</file>
+
+<file path=ppt/notesSlides/notesSlide5.xml><?xml version="1.0" encoding="utf-8"?>
+<p:notes xmlns:a="http://schemas.openxmlformats.org/drawingml/2006/main" xmlns:r="http://schemas.openxmlformats.org/officeDocument/2006/relationships" xmlns:p="http://schemas.openxmlformats.org/presentationml/2006/main">
+  <p:cSld>
+    <p:spTree>
+      <p:nvGrpSpPr>
+        <p:cNvPr id="1" name=""/>
+        <p:cNvGrpSpPr/>
+        <p:nvPr/>
+      </p:nvGrpSpPr>
+      <p:grpSpPr>
+        <a:xfrm>
+          <a:off x="0" y="0"/>
+          <a:ext cx="0" cy="0"/>
+          <a:chOff x="0" y="0"/>
+          <a:chExt cx="0" cy="0"/>
+        </a:xfrm>
+      </p:grpSpPr>
+      <p:sp>
+        <p:nvSpPr>
+          <p:cNvPr id="2" name="Slide Image Placeholder 1"/>
+          <p:cNvSpPr>
+            <a:spLocks noGrp="1" noRot="1" noChangeAspect="1"/>
+          </p:cNvSpPr>
+          <p:nvPr>
+            <p:ph type="sldImg"/>
+          </p:nvPr>
+        </p:nvSpPr>
+        <p:spPr/>
+      </p:sp>
+      <p:sp>
+        <p:nvSpPr>
+          <p:cNvPr id="3" name="Notes Placeholder 2"/>
+          <p:cNvSpPr>
+            <a:spLocks noGrp="1"/>
+          </p:cNvSpPr>
+          <p:nvPr>
+            <p:ph type="body" idx="1"/>
+          </p:nvPr>
+        </p:nvSpPr>
+        <p:spPr/>
+        <p:txBody>
+          <a:bodyPr/>
+          <a:lstStyle/>
+          <a:p>
+            <a:r>
+              <a:rPr lang="en-US" dirty="0" smtClean="0"/>
+              <a:t>In the sample code, take time to note that the list is not processed in</a:t>
+            </a:r>
+            <a:r>
+              <a:rPr lang="en-US" baseline="0" dirty="0" smtClean="0"/>
+              <a:t> order.  PLINQ does support order preservation but the </a:t>
+            </a:r>
+            <a:r>
+              <a:rPr lang="en-US" baseline="0" dirty="0" err="1" smtClean="0"/>
+              <a:t>ForAll</a:t>
+            </a:r>
+            <a:r>
+              <a:rPr lang="en-US" baseline="0" dirty="0" smtClean="0"/>
+              <a:t> doesn’t return results.  You can use .</a:t>
+            </a:r>
+            <a:r>
+              <a:rPr lang="en-US" baseline="0" dirty="0" err="1" smtClean="0"/>
+              <a:t>AsParallel.AsOrdered.Select</a:t>
+            </a:r>
+            <a:r>
+              <a:rPr lang="en-US" baseline="0" dirty="0" smtClean="0"/>
+              <a:t>(…). The select will not process in order but it will return the result set </a:t>
+            </a:r>
+            <a:r>
+              <a:rPr lang="en-US" baseline="0" smtClean="0"/>
+              <a:t>as ordered. </a:t>
+            </a:r>
+            <a:endParaRPr lang="en-US" dirty="0"/>
+          </a:p>
+        </p:txBody>
+      </p:sp>
+      <p:sp>
+        <p:nvSpPr>
+          <p:cNvPr id="4" name="Slide Number Placeholder 3"/>
+          <p:cNvSpPr>
+            <a:spLocks noGrp="1"/>
+          </p:cNvSpPr>
+          <p:nvPr>
+            <p:ph type="sldNum" sz="quarter" idx="10"/>
+          </p:nvPr>
+        </p:nvSpPr>
+        <p:spPr/>
+        <p:txBody>
+          <a:bodyPr/>
+          <a:lstStyle/>
+          <a:p>
+            <a:fld id="{A630FAA3-A8B1-476E-B074-3A4D1235B98E}" type="slidenum">
+              <a:rPr lang="en-US" smtClean="0"/>
+              <a:t>19</a:t>
+            </a:fld>
+            <a:endParaRPr lang="en-US"/>
+          </a:p>
+        </p:txBody>
+      </p:sp>
+    </p:spTree>
+    <p:extLst>
+      <p:ext uri="{BB962C8B-B14F-4D97-AF65-F5344CB8AC3E}">
+        <p14:creationId xmlns:p14="http://schemas.microsoft.com/office/powerpoint/2010/main" val="1633173892"/>
       </p:ext>
     </p:extLst>
   </p:cSld>
@@ -1900,7 +2053,7 @@
           <a:graphicData uri="http://schemas.openxmlformats.org/presentationml/2006/ole">
             <mc:AlternateContent xmlns:mc="http://schemas.openxmlformats.org/markup-compatibility/2006">
               <mc:Choice xmlns:v="urn:schemas-microsoft-com:vml" Requires="v">
-                <p:oleObj spid="_x0000_s1036" name="Image" r:id="rId10" imgW="2279520" imgH="1310400" progId="Photoshop.Image.18">
+                <p:oleObj spid="_x0000_s1042" name="Image" r:id="rId10" imgW="2279520" imgH="1310400" progId="Photoshop.Image.18">
                   <p:embed/>
                 </p:oleObj>
               </mc:Choice>
@@ -2283,7 +2436,12 @@
             <p:ph type="ctrTitle"/>
           </p:nvPr>
         </p:nvSpPr>
-        <p:spPr/>
+        <p:spPr>
+          <a:xfrm>
+            <a:off x="359907" y="3510329"/>
+            <a:ext cx="10800218" cy="2339975"/>
+          </a:xfrm>
+        </p:spPr>
         <p:txBody>
           <a:bodyPr/>
           <a:lstStyle/>
@@ -2500,11 +2658,7 @@
           <a:p>
             <a:r>
               <a:rPr lang="en-US" dirty="0" smtClean="0"/>
-              <a:t>As</a:t>
-            </a:r>
-            <a:r>
-              <a:rPr lang="en-US" dirty="0" smtClean="0"/>
-              <a:t>ynchronous Processing</a:t>
+              <a:t>Asynchronous Processing</a:t>
             </a:r>
             <a:endParaRPr lang="en-US" dirty="0"/>
           </a:p>
@@ -2624,11 +2778,7 @@
           <a:p>
             <a:r>
               <a:rPr lang="en-US" dirty="0" smtClean="0"/>
-              <a:t>Parallel</a:t>
-            </a:r>
-            <a:r>
-              <a:rPr lang="en-US" dirty="0" smtClean="0"/>
-              <a:t> Processing</a:t>
+              <a:t>Parallel Processing</a:t>
             </a:r>
             <a:endParaRPr lang="en-US" dirty="0"/>
           </a:p>
@@ -2759,6 +2909,30 @@
           </a:p>
         </p:txBody>
       </p:sp>
+      <p:pic>
+        <p:nvPicPr>
+          <p:cNvPr id="3" name="Picture 2"/>
+          <p:cNvPicPr>
+            <a:picLocks noChangeAspect="1"/>
+          </p:cNvPicPr>
+          <p:nvPr/>
+        </p:nvPicPr>
+        <p:blipFill>
+          <a:blip r:embed="rId2"/>
+          <a:stretch>
+            <a:fillRect/>
+          </a:stretch>
+        </p:blipFill>
+        <p:spPr>
+          <a:xfrm>
+            <a:off x="4778479" y="0"/>
+            <a:ext cx="1963532" cy="1806933"/>
+          </a:xfrm>
+          <a:prstGeom prst="rect">
+            <a:avLst/>
+          </a:prstGeom>
+        </p:spPr>
+      </p:pic>
     </p:spTree>
     <p:extLst>
       <p:ext uri="{BB962C8B-B14F-4D97-AF65-F5344CB8AC3E}">
@@ -3148,270 +3322,31 @@
       </p:sp>
       <p:sp>
         <p:nvSpPr>
-          <p:cNvPr id="5" name="Rectangle 4"/>
-          <p:cNvSpPr/>
-          <p:nvPr/>
+          <p:cNvPr id="6" name="Content Placeholder 1"/>
+          <p:cNvSpPr>
+            <a:spLocks noGrp="1"/>
+          </p:cNvSpPr>
+          <p:nvPr>
+            <p:ph idx="1"/>
+          </p:nvPr>
         </p:nvSpPr>
         <p:spPr>
           <a:xfrm>
-            <a:off x="884903" y="2085926"/>
-            <a:ext cx="7754272" cy="1754326"/>
+            <a:off x="552629" y="2179537"/>
+            <a:ext cx="10246915" cy="1709069"/>
           </a:xfrm>
-          <a:prstGeom prst="rect">
-            <a:avLst/>
-          </a:prstGeom>
         </p:spPr>
         <p:txBody>
-          <a:bodyPr wrap="square">
-            <a:spAutoFit/>
+          <a:bodyPr>
+            <a:noAutofit/>
           </a:bodyPr>
           <a:lstStyle/>
           <a:p>
             <a:r>
-              <a:rPr lang="en-US" dirty="0">
-                <a:solidFill>
-                  <a:srgbClr val="000000"/>
-                </a:solidFill>
-                <a:latin typeface="Consolas" panose="020B0609020204030204" pitchFamily="49" charset="0"/>
-              </a:rPr>
-              <a:t> </a:t>
-            </a:r>
-            <a:r>
-              <a:rPr lang="en-US" dirty="0">
-                <a:solidFill>
-                  <a:srgbClr val="0000FF"/>
-                </a:solidFill>
-                <a:latin typeface="Consolas" panose="020B0609020204030204" pitchFamily="49" charset="0"/>
-              </a:rPr>
-              <a:t>private</a:t>
-            </a:r>
-            <a:r>
-              <a:rPr lang="en-US" dirty="0">
-                <a:solidFill>
-                  <a:srgbClr val="000000"/>
-                </a:solidFill>
-                <a:latin typeface="Consolas" panose="020B0609020204030204" pitchFamily="49" charset="0"/>
-              </a:rPr>
-              <a:t> </a:t>
-            </a:r>
-            <a:r>
-              <a:rPr lang="en-US" dirty="0">
-                <a:solidFill>
-                  <a:srgbClr val="0000FF"/>
-                </a:solidFill>
-                <a:latin typeface="Consolas" panose="020B0609020204030204" pitchFamily="49" charset="0"/>
-              </a:rPr>
-              <a:t>async</a:t>
-            </a:r>
-            <a:r>
-              <a:rPr lang="en-US" dirty="0">
-                <a:solidFill>
-                  <a:srgbClr val="000000"/>
-                </a:solidFill>
-                <a:latin typeface="Consolas" panose="020B0609020204030204" pitchFamily="49" charset="0"/>
-              </a:rPr>
-              <a:t> </a:t>
-            </a:r>
-            <a:r>
-              <a:rPr lang="en-US" dirty="0">
-                <a:solidFill>
-                  <a:srgbClr val="2B91AF"/>
-                </a:solidFill>
-                <a:latin typeface="Consolas" panose="020B0609020204030204" pitchFamily="49" charset="0"/>
-              </a:rPr>
-              <a:t>Task</a:t>
-            </a:r>
-            <a:r>
-              <a:rPr lang="en-US" dirty="0">
-                <a:solidFill>
-                  <a:srgbClr val="000000"/>
-                </a:solidFill>
-                <a:latin typeface="Consolas" panose="020B0609020204030204" pitchFamily="49" charset="0"/>
-              </a:rPr>
-              <a:t>&lt;</a:t>
-            </a:r>
-            <a:r>
-              <a:rPr lang="en-US" dirty="0">
-                <a:solidFill>
-                  <a:srgbClr val="0000FF"/>
-                </a:solidFill>
-                <a:latin typeface="Consolas" panose="020B0609020204030204" pitchFamily="49" charset="0"/>
-              </a:rPr>
-              <a:t>string</a:t>
-            </a:r>
-            <a:r>
-              <a:rPr lang="en-US" dirty="0">
-                <a:solidFill>
-                  <a:srgbClr val="000000"/>
-                </a:solidFill>
-                <a:latin typeface="Consolas" panose="020B0609020204030204" pitchFamily="49" charset="0"/>
-              </a:rPr>
-              <a:t>&gt; DoStuff()</a:t>
-            </a:r>
-          </a:p>
-          <a:p>
-            <a:r>
-              <a:rPr lang="en-US" dirty="0">
-                <a:solidFill>
-                  <a:srgbClr val="000000"/>
-                </a:solidFill>
-                <a:latin typeface="Consolas" panose="020B0609020204030204" pitchFamily="49" charset="0"/>
-              </a:rPr>
-              <a:t>    {</a:t>
-            </a:r>
-          </a:p>
-          <a:p>
-            <a:r>
-              <a:rPr lang="en-US" dirty="0">
-                <a:solidFill>
-                  <a:srgbClr val="000000"/>
-                </a:solidFill>
-                <a:latin typeface="Consolas" panose="020B0609020204030204" pitchFamily="49" charset="0"/>
-              </a:rPr>
-              <a:t>      </a:t>
-            </a:r>
-            <a:r>
-              <a:rPr lang="en-US" dirty="0">
-                <a:solidFill>
-                  <a:srgbClr val="0000FF"/>
-                </a:solidFill>
-                <a:latin typeface="Consolas" panose="020B0609020204030204" pitchFamily="49" charset="0"/>
-              </a:rPr>
-              <a:t>var</a:t>
-            </a:r>
-            <a:r>
-              <a:rPr lang="en-US" dirty="0">
-                <a:solidFill>
-                  <a:srgbClr val="000000"/>
-                </a:solidFill>
-                <a:latin typeface="Consolas" panose="020B0609020204030204" pitchFamily="49" charset="0"/>
-              </a:rPr>
-              <a:t> result = </a:t>
-            </a:r>
-            <a:r>
-              <a:rPr lang="en-US" dirty="0">
-                <a:solidFill>
-                  <a:srgbClr val="0000FF"/>
-                </a:solidFill>
-                <a:latin typeface="Consolas" panose="020B0609020204030204" pitchFamily="49" charset="0"/>
-              </a:rPr>
-              <a:t>await</a:t>
-            </a:r>
-            <a:r>
-              <a:rPr lang="en-US" dirty="0">
-                <a:solidFill>
-                  <a:srgbClr val="000000"/>
-                </a:solidFill>
-                <a:latin typeface="Consolas" panose="020B0609020204030204" pitchFamily="49" charset="0"/>
-              </a:rPr>
-              <a:t> LongRunningOperation();</a:t>
-            </a:r>
-          </a:p>
-          <a:p>
-            <a:r>
-              <a:rPr lang="en-US" dirty="0">
-                <a:solidFill>
-                  <a:srgbClr val="000000"/>
-                </a:solidFill>
-                <a:latin typeface="Consolas" panose="020B0609020204030204" pitchFamily="49" charset="0"/>
-              </a:rPr>
-              <a:t>      </a:t>
-            </a:r>
-            <a:r>
-              <a:rPr lang="en-US" dirty="0">
-                <a:solidFill>
-                  <a:srgbClr val="2B91AF"/>
-                </a:solidFill>
-                <a:latin typeface="Consolas" panose="020B0609020204030204" pitchFamily="49" charset="0"/>
-              </a:rPr>
-              <a:t>Console</a:t>
-            </a:r>
-            <a:r>
-              <a:rPr lang="en-US" dirty="0">
-                <a:solidFill>
-                  <a:srgbClr val="000000"/>
-                </a:solidFill>
-                <a:latin typeface="Consolas" panose="020B0609020204030204" pitchFamily="49" charset="0"/>
-              </a:rPr>
-              <a:t>.WriteLine(</a:t>
-            </a:r>
-            <a:r>
-              <a:rPr lang="en-US" dirty="0">
-                <a:solidFill>
-                  <a:srgbClr val="A31515"/>
-                </a:solidFill>
-                <a:latin typeface="Consolas" panose="020B0609020204030204" pitchFamily="49" charset="0"/>
-              </a:rPr>
-              <a:t>$"Counts complete: </a:t>
-            </a:r>
-            <a:r>
-              <a:rPr lang="en-US" dirty="0">
-                <a:solidFill>
-                  <a:srgbClr val="000000"/>
-                </a:solidFill>
-                <a:latin typeface="Consolas" panose="020B0609020204030204" pitchFamily="49" charset="0"/>
-              </a:rPr>
-              <a:t>{result}</a:t>
-            </a:r>
-            <a:r>
-              <a:rPr lang="en-US" dirty="0">
-                <a:solidFill>
-                  <a:srgbClr val="A31515"/>
-                </a:solidFill>
-                <a:latin typeface="Consolas" panose="020B0609020204030204" pitchFamily="49" charset="0"/>
-              </a:rPr>
-              <a:t>"</a:t>
-            </a:r>
-            <a:r>
-              <a:rPr lang="en-US" dirty="0">
-                <a:solidFill>
-                  <a:srgbClr val="000000"/>
-                </a:solidFill>
-                <a:latin typeface="Consolas" panose="020B0609020204030204" pitchFamily="49" charset="0"/>
-              </a:rPr>
-              <a:t>);</a:t>
-            </a:r>
-          </a:p>
-          <a:p>
-            <a:r>
-              <a:rPr lang="en-US" dirty="0">
-                <a:solidFill>
-                  <a:srgbClr val="000000"/>
-                </a:solidFill>
-                <a:latin typeface="Consolas" panose="020B0609020204030204" pitchFamily="49" charset="0"/>
-              </a:rPr>
-              <a:t>      </a:t>
-            </a:r>
-            <a:r>
-              <a:rPr lang="en-US" dirty="0">
-                <a:solidFill>
-                  <a:srgbClr val="0000FF"/>
-                </a:solidFill>
-                <a:latin typeface="Consolas" panose="020B0609020204030204" pitchFamily="49" charset="0"/>
-              </a:rPr>
-              <a:t>return</a:t>
-            </a:r>
-            <a:r>
-              <a:rPr lang="en-US" dirty="0">
-                <a:solidFill>
-                  <a:srgbClr val="000000"/>
-                </a:solidFill>
-                <a:latin typeface="Consolas" panose="020B0609020204030204" pitchFamily="49" charset="0"/>
-              </a:rPr>
-              <a:t> result;</a:t>
-            </a:r>
-          </a:p>
-          <a:p>
-            <a:r>
-              <a:rPr lang="en-US" dirty="0">
-                <a:solidFill>
-                  <a:srgbClr val="000000"/>
-                </a:solidFill>
-                <a:latin typeface="Consolas" panose="020B0609020204030204" pitchFamily="49" charset="0"/>
-              </a:rPr>
-              <a:t>    }</a:t>
-            </a:r>
-            <a:endParaRPr lang="en-US" dirty="0"/>
+              <a:rPr lang="en-US" sz="8800" dirty="0" smtClean="0"/>
+              <a:t>Show me the Code!</a:t>
+            </a:r>
+            <a:endParaRPr lang="en-US" sz="8800" dirty="0"/>
           </a:p>
         </p:txBody>
       </p:sp>
@@ -3599,6 +3534,131 @@
       </p:grpSpPr>
       <p:sp>
         <p:nvSpPr>
+          <p:cNvPr id="2" name="Content Placeholder 1"/>
+          <p:cNvSpPr>
+            <a:spLocks noGrp="1"/>
+          </p:cNvSpPr>
+          <p:nvPr>
+            <p:ph idx="1"/>
+          </p:nvPr>
+        </p:nvSpPr>
+        <p:spPr>
+          <a:xfrm>
+            <a:off x="552629" y="2179537"/>
+            <a:ext cx="10246915" cy="1709069"/>
+          </a:xfrm>
+        </p:spPr>
+        <p:txBody>
+          <a:bodyPr>
+            <a:noAutofit/>
+          </a:bodyPr>
+          <a:lstStyle/>
+          <a:p>
+            <a:r>
+              <a:rPr lang="en-US" sz="8800" dirty="0" smtClean="0"/>
+              <a:t>Show me the Code!</a:t>
+            </a:r>
+            <a:endParaRPr lang="en-US" sz="8800" dirty="0"/>
+          </a:p>
+        </p:txBody>
+      </p:sp>
+      <p:sp>
+        <p:nvSpPr>
+          <p:cNvPr id="3" name="Title 3"/>
+          <p:cNvSpPr txBox="1">
+            <a:spLocks/>
+          </p:cNvSpPr>
+          <p:nvPr/>
+        </p:nvSpPr>
+        <p:spPr>
+          <a:xfrm>
+            <a:off x="361038" y="360363"/>
+            <a:ext cx="10800000" cy="720000"/>
+          </a:xfrm>
+          <a:prstGeom prst="rect">
+            <a:avLst/>
+          </a:prstGeom>
+        </p:spPr>
+        <p:txBody>
+          <a:bodyPr/>
+          <a:lstStyle>
+            <a:lvl1pPr algn="l" defTabSz="576026" rtl="0" eaLnBrk="1" latinLnBrk="0" hangingPunct="1">
+              <a:spcBef>
+                <a:spcPct val="0"/>
+              </a:spcBef>
+              <a:buNone/>
+              <a:defRPr sz="4400" kern="1200">
+                <a:solidFill>
+                  <a:schemeClr val="accent1"/>
+                </a:solidFill>
+                <a:latin typeface="+mj-lt"/>
+                <a:ea typeface="+mj-ea"/>
+                <a:cs typeface="+mj-cs"/>
+              </a:defRPr>
+            </a:lvl1pPr>
+          </a:lstStyle>
+          <a:p>
+            <a:r>
+              <a:rPr lang="en-US" dirty="0" smtClean="0">
+                <a:hlinkClick r:id="rId2"/>
+              </a:rPr>
+              <a:t>Web </a:t>
+            </a:r>
+            <a:r>
+              <a:rPr lang="en-US" dirty="0" smtClean="0">
+                <a:hlinkClick r:id="rId2"/>
+              </a:rPr>
+              <a:t>API </a:t>
+            </a:r>
+            <a:r>
+              <a:rPr lang="en-US" dirty="0" smtClean="0">
+                <a:hlinkClick r:id="rId2"/>
+              </a:rPr>
+              <a:t>Async Example</a:t>
+            </a:r>
+            <a:endParaRPr lang="en-US" dirty="0"/>
+          </a:p>
+        </p:txBody>
+      </p:sp>
+    </p:spTree>
+    <p:extLst>
+      <p:ext uri="{BB962C8B-B14F-4D97-AF65-F5344CB8AC3E}">
+        <p14:creationId xmlns:p14="http://schemas.microsoft.com/office/powerpoint/2010/main" val="2510957274"/>
+      </p:ext>
+    </p:extLst>
+  </p:cSld>
+  <p:clrMapOvr>
+    <a:masterClrMapping/>
+  </p:clrMapOvr>
+  <p:timing>
+    <p:tnLst>
+      <p:par>
+        <p:cTn id="1" dur="indefinite" restart="never" nodeType="tmRoot"/>
+      </p:par>
+    </p:tnLst>
+  </p:timing>
+</p:sld>
+</file>
+
+<file path=ppt/slides/slide17.xml><?xml version="1.0" encoding="utf-8"?>
+<p:sld xmlns:a="http://schemas.openxmlformats.org/drawingml/2006/main" xmlns:r="http://schemas.openxmlformats.org/officeDocument/2006/relationships" xmlns:p="http://schemas.openxmlformats.org/presentationml/2006/main">
+  <p:cSld>
+    <p:spTree>
+      <p:nvGrpSpPr>
+        <p:cNvPr id="1" name=""/>
+        <p:cNvGrpSpPr/>
+        <p:nvPr/>
+      </p:nvGrpSpPr>
+      <p:grpSpPr>
+        <a:xfrm>
+          <a:off x="0" y="0"/>
+          <a:ext cx="0" cy="0"/>
+          <a:chOff x="0" y="0"/>
+          <a:chExt cx="0" cy="0"/>
+        </a:xfrm>
+      </p:grpSpPr>
+      <p:sp>
+        <p:nvSpPr>
           <p:cNvPr id="2" name="Title 1"/>
           <p:cNvSpPr>
             <a:spLocks noGrp="1"/>
@@ -3647,7 +3707,7 @@
 </p:sld>
 </file>
 
-<file path=ppt/slides/slide17.xml><?xml version="1.0" encoding="utf-8"?>
+<file path=ppt/slides/slide18.xml><?xml version="1.0" encoding="utf-8"?>
 <p:sld xmlns:a="http://schemas.openxmlformats.org/drawingml/2006/main" xmlns:r="http://schemas.openxmlformats.org/officeDocument/2006/relationships" xmlns:p="http://schemas.openxmlformats.org/presentationml/2006/main">
   <p:cSld>
     <p:spTree>
@@ -3887,7 +3947,25 @@
                 </a:solidFill>
                 <a:latin typeface="Segoe UI" panose="020B0502040204020203" pitchFamily="34" charset="0"/>
               </a:rPr>
-              <a:t> is simply to simplify task basked programming.</a:t>
+              <a:t> is simply to simplify task </a:t>
+            </a:r>
+            <a:r>
+              <a:rPr lang="en-US" sz="3300" dirty="0" smtClean="0">
+                <a:solidFill>
+                  <a:srgbClr val="454545"/>
+                </a:solidFill>
+                <a:latin typeface="Segoe UI" panose="020B0502040204020203" pitchFamily="34" charset="0"/>
+              </a:rPr>
+              <a:t>based parallel </a:t>
+            </a:r>
+            <a:r>
+              <a:rPr lang="en-US" sz="3300" dirty="0" smtClean="0">
+                <a:solidFill>
+                  <a:srgbClr val="454545"/>
+                </a:solidFill>
+                <a:latin typeface="Segoe UI" panose="020B0502040204020203" pitchFamily="34" charset="0"/>
+              </a:rPr>
+              <a:t>programming.</a:t>
             </a:r>
           </a:p>
         </p:txBody>
@@ -3896,151 +3974,6 @@
     <p:extLst>
       <p:ext uri="{BB962C8B-B14F-4D97-AF65-F5344CB8AC3E}">
         <p14:creationId xmlns:p14="http://schemas.microsoft.com/office/powerpoint/2010/main" val="2236233703"/>
-      </p:ext>
-    </p:extLst>
-  </p:cSld>
-  <p:clrMapOvr>
-    <a:masterClrMapping/>
-  </p:clrMapOvr>
-  <p:timing>
-    <p:tnLst>
-      <p:par>
-        <p:cTn id="1" dur="indefinite" restart="never" nodeType="tmRoot"/>
-      </p:par>
-    </p:tnLst>
-  </p:timing>
-</p:sld>
-</file>
-
-<file path=ppt/slides/slide18.xml><?xml version="1.0" encoding="utf-8"?>
-<p:sld xmlns:a="http://schemas.openxmlformats.org/drawingml/2006/main" xmlns:r="http://schemas.openxmlformats.org/officeDocument/2006/relationships" xmlns:p="http://schemas.openxmlformats.org/presentationml/2006/main">
-  <p:cSld>
-    <p:spTree>
-      <p:nvGrpSpPr>
-        <p:cNvPr id="1" name=""/>
-        <p:cNvGrpSpPr/>
-        <p:nvPr/>
-      </p:nvGrpSpPr>
-      <p:grpSpPr>
-        <a:xfrm>
-          <a:off x="0" y="0"/>
-          <a:ext cx="0" cy="0"/>
-          <a:chOff x="0" y="0"/>
-          <a:chExt cx="0" cy="0"/>
-        </a:xfrm>
-      </p:grpSpPr>
-      <p:sp>
-        <p:nvSpPr>
-          <p:cNvPr id="4" name="Title 3"/>
-          <p:cNvSpPr txBox="1">
-            <a:spLocks/>
-          </p:cNvSpPr>
-          <p:nvPr/>
-        </p:nvSpPr>
-        <p:spPr>
-          <a:xfrm>
-            <a:off x="361038" y="360363"/>
-            <a:ext cx="10800000" cy="720000"/>
-          </a:xfrm>
-          <a:prstGeom prst="rect">
-            <a:avLst/>
-          </a:prstGeom>
-        </p:spPr>
-        <p:txBody>
-          <a:bodyPr/>
-          <a:lstStyle>
-            <a:lvl1pPr algn="l" defTabSz="576026" rtl="0" eaLnBrk="1" latinLnBrk="0" hangingPunct="1">
-              <a:spcBef>
-                <a:spcPct val="0"/>
-              </a:spcBef>
-              <a:buNone/>
-              <a:defRPr sz="4400" kern="1200">
-                <a:solidFill>
-                  <a:schemeClr val="accent1"/>
-                </a:solidFill>
-                <a:latin typeface="+mj-lt"/>
-                <a:ea typeface="+mj-ea"/>
-                <a:cs typeface="+mj-cs"/>
-              </a:defRPr>
-            </a:lvl1pPr>
-          </a:lstStyle>
-          <a:p>
-            <a:r>
-              <a:rPr lang="en-US" dirty="0" smtClean="0">
-                <a:hlinkClick r:id="rId2"/>
-              </a:rPr>
-              <a:t>Simple Parallel Examples</a:t>
-            </a:r>
-            <a:endParaRPr lang="en-US" dirty="0"/>
-          </a:p>
-        </p:txBody>
-      </p:sp>
-      <p:sp>
-        <p:nvSpPr>
-          <p:cNvPr id="2" name="TextBox 1"/>
-          <p:cNvSpPr txBox="1"/>
-          <p:nvPr/>
-        </p:nvSpPr>
-        <p:spPr>
-          <a:xfrm>
-            <a:off x="464456" y="1603043"/>
-            <a:ext cx="10696581" cy="2862322"/>
-          </a:xfrm>
-          <a:prstGeom prst="rect">
-            <a:avLst/>
-          </a:prstGeom>
-          <a:noFill/>
-        </p:spPr>
-        <p:txBody>
-          <a:bodyPr wrap="square" rtlCol="0">
-            <a:spAutoFit/>
-          </a:bodyPr>
-          <a:lstStyle/>
-          <a:p>
-            <a:r>
-              <a:rPr lang="en-US" sz="3600" dirty="0" smtClean="0"/>
-              <a:t>Task parallel or PLINQ is not automatically mean it’s always the most efficient. Knowing you application and testing variations of </a:t>
-            </a:r>
-            <a:r>
-              <a:rPr lang="en-US" sz="3600" b="1" dirty="0" err="1" smtClean="0"/>
-              <a:t>Task.ForEach</a:t>
-            </a:r>
-            <a:r>
-              <a:rPr lang="en-US" sz="3600" dirty="0" smtClean="0"/>
-              <a:t>, .</a:t>
-            </a:r>
-            <a:r>
-              <a:rPr lang="en-US" sz="3600" b="1" dirty="0" err="1" smtClean="0"/>
-              <a:t>AsParallel.ForAll</a:t>
-            </a:r>
-            <a:r>
-              <a:rPr lang="en-US" sz="3600" dirty="0" smtClean="0"/>
-              <a:t>, or simply </a:t>
-            </a:r>
-            <a:r>
-              <a:rPr lang="en-US" sz="3600" b="1" dirty="0" smtClean="0"/>
-              <a:t>.</a:t>
-            </a:r>
-            <a:r>
-              <a:rPr lang="en-US" sz="3600" b="1" dirty="0" err="1" smtClean="0"/>
-              <a:t>ForEach</a:t>
-            </a:r>
-            <a:r>
-              <a:rPr lang="en-US" sz="3600" b="1" dirty="0" smtClean="0"/>
-              <a:t> </a:t>
-            </a:r>
-            <a:r>
-              <a:rPr lang="en-US" sz="3600" dirty="0" smtClean="0"/>
-              <a:t>when optimizing performance, is needed. </a:t>
-            </a:r>
-            <a:endParaRPr lang="en-US" sz="3600" dirty="0"/>
-          </a:p>
-        </p:txBody>
-      </p:sp>
-    </p:spTree>
-    <p:extLst>
-      <p:ext uri="{BB962C8B-B14F-4D97-AF65-F5344CB8AC3E}">
-        <p14:creationId xmlns:p14="http://schemas.microsoft.com/office/powerpoint/2010/main" val="325101751"/>
       </p:ext>
     </p:extLst>
   </p:cSld>
@@ -4076,31 +4009,116 @@
       </p:grpSpPr>
       <p:sp>
         <p:nvSpPr>
-          <p:cNvPr id="2" name="Title 1"/>
-          <p:cNvSpPr>
-            <a:spLocks noGrp="1"/>
+          <p:cNvPr id="4" name="Title 3"/>
+          <p:cNvSpPr txBox="1">
+            <a:spLocks/>
           </p:cNvSpPr>
-          <p:nvPr>
-            <p:ph type="title"/>
-          </p:nvPr>
-        </p:nvSpPr>
-        <p:spPr/>
+          <p:nvPr/>
+        </p:nvSpPr>
+        <p:spPr>
+          <a:xfrm>
+            <a:off x="361038" y="360363"/>
+            <a:ext cx="10800000" cy="720000"/>
+          </a:xfrm>
+          <a:prstGeom prst="rect">
+            <a:avLst/>
+          </a:prstGeom>
+        </p:spPr>
         <p:txBody>
           <a:bodyPr/>
+          <a:lstStyle>
+            <a:lvl1pPr algn="l" defTabSz="576026" rtl="0" eaLnBrk="1" latinLnBrk="0" hangingPunct="1">
+              <a:spcBef>
+                <a:spcPct val="0"/>
+              </a:spcBef>
+              <a:buNone/>
+              <a:defRPr sz="4400" kern="1200">
+                <a:solidFill>
+                  <a:schemeClr val="accent1"/>
+                </a:solidFill>
+                <a:latin typeface="+mj-lt"/>
+                <a:ea typeface="+mj-ea"/>
+                <a:cs typeface="+mj-cs"/>
+              </a:defRPr>
+            </a:lvl1pPr>
+          </a:lstStyle>
+          <a:p>
+            <a:r>
+              <a:rPr lang="en-US" dirty="0" smtClean="0">
+                <a:hlinkClick r:id="rId3"/>
+              </a:rPr>
+              <a:t>Simple Parallel Examples</a:t>
+            </a:r>
+            <a:endParaRPr lang="en-US" dirty="0"/>
+          </a:p>
+        </p:txBody>
+      </p:sp>
+      <p:sp>
+        <p:nvSpPr>
+          <p:cNvPr id="2" name="TextBox 1"/>
+          <p:cNvSpPr txBox="1"/>
+          <p:nvPr/>
+        </p:nvSpPr>
+        <p:spPr>
+          <a:xfrm>
+            <a:off x="464456" y="1603043"/>
+            <a:ext cx="10696581" cy="2862322"/>
+          </a:xfrm>
+          <a:prstGeom prst="rect">
+            <a:avLst/>
+          </a:prstGeom>
+          <a:noFill/>
+        </p:spPr>
+        <p:txBody>
+          <a:bodyPr wrap="square" rtlCol="0">
+            <a:spAutoFit/>
+          </a:bodyPr>
           <a:lstStyle/>
           <a:p>
             <a:r>
-              <a:rPr lang="en-US" dirty="0" smtClean="0"/>
-              <a:t>Lets Review</a:t>
-            </a:r>
-            <a:endParaRPr lang="en-US" dirty="0"/>
+              <a:rPr lang="en-US" sz="3600" dirty="0" smtClean="0"/>
+              <a:t>Task parallel or PLINQ is not automatically mean it’s always the most efficient. Knowing you application and testing variations of </a:t>
+            </a:r>
+            <a:r>
+              <a:rPr lang="en-US" sz="3600" b="1" dirty="0" err="1" smtClean="0"/>
+              <a:t>Task.ForEach</a:t>
+            </a:r>
+            <a:r>
+              <a:rPr lang="en-US" sz="3600" dirty="0" smtClean="0"/>
+              <a:t>, .</a:t>
+            </a:r>
+            <a:r>
+              <a:rPr lang="en-US" sz="3600" b="1" dirty="0" err="1" smtClean="0"/>
+              <a:t>AsParallel.ForAll</a:t>
+            </a:r>
+            <a:r>
+              <a:rPr lang="en-US" sz="3600" dirty="0" smtClean="0"/>
+              <a:t>, or simply </a:t>
+            </a:r>
+            <a:r>
+              <a:rPr lang="en-US" sz="3600" b="1" dirty="0" smtClean="0"/>
+              <a:t>.</a:t>
+            </a:r>
+            <a:r>
+              <a:rPr lang="en-US" sz="3600" b="1" dirty="0" err="1" smtClean="0"/>
+              <a:t>ForEach</a:t>
+            </a:r>
+            <a:r>
+              <a:rPr lang="en-US" sz="3600" b="1" dirty="0" smtClean="0"/>
+              <a:t> </a:t>
+            </a:r>
+            <a:r>
+              <a:rPr lang="en-US" sz="3600" dirty="0" smtClean="0"/>
+              <a:t>when optimizing performance, is needed. </a:t>
+            </a:r>
+            <a:endParaRPr lang="en-US" sz="3600" dirty="0"/>
           </a:p>
         </p:txBody>
       </p:sp>
     </p:spTree>
     <p:extLst>
       <p:ext uri="{BB962C8B-B14F-4D97-AF65-F5344CB8AC3E}">
-        <p14:creationId xmlns:p14="http://schemas.microsoft.com/office/powerpoint/2010/main" val="339235700"/>
+        <p14:creationId xmlns:p14="http://schemas.microsoft.com/office/powerpoint/2010/main" val="325101751"/>
       </p:ext>
     </p:extLst>
   </p:cSld>
@@ -4150,19 +4168,15 @@
           <a:lstStyle/>
           <a:p>
             <a:r>
-              <a:rPr lang="en-US" smtClean="0"/>
+              <a:rPr lang="en-US" dirty="0" smtClean="0"/>
               <a:t>Processes </a:t>
             </a:r>
             <a:br>
-              <a:rPr lang="en-US" smtClean="0"/>
+              <a:rPr lang="en-US" dirty="0" smtClean="0"/>
             </a:br>
             <a:r>
-              <a:rPr lang="en-US" smtClean="0"/>
-              <a:t>&amp; </a:t>
-            </a:r>
-            <a:r>
               <a:rPr lang="en-US" dirty="0" smtClean="0"/>
-              <a:t>Threads</a:t>
+              <a:t>&amp; Threads</a:t>
             </a:r>
             <a:endParaRPr lang="en-US" dirty="0"/>
           </a:p>
@@ -4207,6 +4221,66 @@
       </p:grpSpPr>
       <p:sp>
         <p:nvSpPr>
+          <p:cNvPr id="2" name="Title 1"/>
+          <p:cNvSpPr>
+            <a:spLocks noGrp="1"/>
+          </p:cNvSpPr>
+          <p:nvPr>
+            <p:ph type="title"/>
+          </p:nvPr>
+        </p:nvSpPr>
+        <p:spPr/>
+        <p:txBody>
+          <a:bodyPr/>
+          <a:lstStyle/>
+          <a:p>
+            <a:r>
+              <a:rPr lang="en-US" dirty="0" smtClean="0"/>
+              <a:t>Lets Review</a:t>
+            </a:r>
+            <a:endParaRPr lang="en-US" dirty="0"/>
+          </a:p>
+        </p:txBody>
+      </p:sp>
+    </p:spTree>
+    <p:extLst>
+      <p:ext uri="{BB962C8B-B14F-4D97-AF65-F5344CB8AC3E}">
+        <p14:creationId xmlns:p14="http://schemas.microsoft.com/office/powerpoint/2010/main" val="339235700"/>
+      </p:ext>
+    </p:extLst>
+  </p:cSld>
+  <p:clrMapOvr>
+    <a:masterClrMapping/>
+  </p:clrMapOvr>
+  <p:timing>
+    <p:tnLst>
+      <p:par>
+        <p:cTn id="1" dur="indefinite" restart="never" nodeType="tmRoot"/>
+      </p:par>
+    </p:tnLst>
+  </p:timing>
+</p:sld>
+</file>
+
+<file path=ppt/slides/slide21.xml><?xml version="1.0" encoding="utf-8"?>
+<p:sld xmlns:a="http://schemas.openxmlformats.org/drawingml/2006/main" xmlns:r="http://schemas.openxmlformats.org/officeDocument/2006/relationships" xmlns:p="http://schemas.openxmlformats.org/presentationml/2006/main">
+  <p:cSld>
+    <p:spTree>
+      <p:nvGrpSpPr>
+        <p:cNvPr id="1" name=""/>
+        <p:cNvGrpSpPr/>
+        <p:nvPr/>
+      </p:nvGrpSpPr>
+      <p:grpSpPr>
+        <a:xfrm>
+          <a:off x="0" y="0"/>
+          <a:ext cx="0" cy="0"/>
+          <a:chOff x="0" y="0"/>
+          <a:chExt cx="0" cy="0"/>
+        </a:xfrm>
+      </p:grpSpPr>
+      <p:sp>
+        <p:nvSpPr>
           <p:cNvPr id="6" name="TextBox 5"/>
           <p:cNvSpPr txBox="1"/>
           <p:nvPr/>
@@ -4316,7 +4390,7 @@
 </p:sld>
 </file>
 
-<file path=ppt/slides/slide21.xml><?xml version="1.0" encoding="utf-8"?>
+<file path=ppt/slides/slide22.xml><?xml version="1.0" encoding="utf-8"?>
 <p:sld xmlns:a="http://schemas.openxmlformats.org/drawingml/2006/main" xmlns:r="http://schemas.openxmlformats.org/officeDocument/2006/relationships" xmlns:p="http://schemas.openxmlformats.org/presentationml/2006/main">
   <p:cSld>
     <p:spTree>
@@ -4539,7 +4613,7 @@
               <a:buChar char="•"/>
             </a:pPr>
             <a:r>
-              <a:rPr lang="en-US" dirty="0"/>
+              <a:rPr lang="en-US" dirty="0" smtClean="0"/>
               <a:t>Processes communicate with one another through messages, using Microsoft's Remote Procedure Call (RPC) technology to pass information to one another. There is no difference to the caller between a call coming from a process on a remote machine and a call coming from another process on the same machine.</a:t>
             </a:r>
           </a:p>
@@ -4565,6 +4639,14 @@
   <p:clrMapOvr>
     <a:masterClrMapping/>
   </p:clrMapOvr>
+  <mc:AlternateContent xmlns:mc="http://schemas.openxmlformats.org/markup-compatibility/2006">
+    <mc:Choice xmlns:p14="http://schemas.microsoft.com/office/powerpoint/2010/main" Requires="p14">
+      <p:transition spd="slow" p14:dur="2000"/>
+    </mc:Choice>
+    <mc:Fallback>
+      <p:transition spd="slow"/>
+    </mc:Fallback>
+  </mc:AlternateContent>
   <p:timing>
     <p:tnLst>
       <p:par>
@@ -4623,8 +4705,8 @@
         </p:nvSpPr>
         <p:spPr>
           <a:xfrm>
-            <a:off x="361038" y="1679331"/>
-            <a:ext cx="10664516" cy="4154984"/>
+            <a:off x="361038" y="1246190"/>
+            <a:ext cx="10664516" cy="5170646"/>
           </a:xfrm>
           <a:prstGeom prst="rect">
             <a:avLst/>
@@ -4641,7 +4723,7 @@
               <a:buChar char="•"/>
             </a:pPr>
             <a:r>
-              <a:rPr lang="en-US" sz="3300" dirty="0">
+              <a:rPr lang="en-US" sz="3200" dirty="0">
                 <a:solidFill>
                   <a:srgbClr val="454545"/>
                 </a:solidFill>
@@ -4650,7 +4732,7 @@
               <a:t>A </a:t>
             </a:r>
             <a:r>
-              <a:rPr lang="en-US" sz="3300" i="1" dirty="0">
+              <a:rPr lang="en-US" sz="3200" i="1" dirty="0">
                 <a:solidFill>
                   <a:srgbClr val="454545"/>
                 </a:solidFill>
@@ -4659,7 +4741,7 @@
               <a:t>thread</a:t>
             </a:r>
             <a:r>
-              <a:rPr lang="en-US" sz="3300" dirty="0">
+              <a:rPr lang="en-US" sz="3200" dirty="0">
                 <a:solidFill>
                   <a:srgbClr val="454545"/>
                 </a:solidFill>
@@ -4667,7 +4749,7 @@
               </a:rPr>
               <a:t> is code that is to be serially executed within a process. </a:t>
             </a:r>
-            <a:endParaRPr lang="en-US" sz="3300" dirty="0" smtClean="0">
+            <a:endParaRPr lang="en-US" sz="3200" dirty="0" smtClean="0">
               <a:solidFill>
                 <a:srgbClr val="454545"/>
               </a:solidFill>
@@ -4679,7 +4761,7 @@
               <a:buFont typeface="Arial" panose="020B0604020202020204" pitchFamily="34" charset="0"/>
               <a:buChar char="•"/>
             </a:pPr>
-            <a:endParaRPr lang="en-US" sz="3300" dirty="0" smtClean="0">
+            <a:endParaRPr lang="en-US" sz="3200" dirty="0" smtClean="0">
               <a:solidFill>
                 <a:srgbClr val="454545"/>
               </a:solidFill>
@@ -4692,7 +4774,7 @@
               <a:buChar char="•"/>
             </a:pPr>
             <a:r>
-              <a:rPr lang="en-US" sz="3300" dirty="0" smtClean="0">
+              <a:rPr lang="en-US" sz="3200" dirty="0" smtClean="0">
                 <a:solidFill>
                   <a:srgbClr val="454545"/>
                 </a:solidFill>
@@ -4701,7 +4783,7 @@
               <a:t>A </a:t>
             </a:r>
             <a:r>
-              <a:rPr lang="en-US" sz="3300" dirty="0">
+              <a:rPr lang="en-US" sz="3200" dirty="0">
                 <a:solidFill>
                   <a:srgbClr val="454545"/>
                 </a:solidFill>
@@ -4710,7 +4792,7 @@
               <a:t>processor executes threads, not processes, so each application has at least one process, and a process always has at least one thread of execution, known as the </a:t>
             </a:r>
             <a:r>
-              <a:rPr lang="en-US" sz="3300" dirty="0" smtClean="0">
+              <a:rPr lang="en-US" sz="3200" dirty="0" smtClean="0">
                 <a:solidFill>
                   <a:srgbClr val="454545"/>
                 </a:solidFill>
@@ -4719,15 +4801,57 @@
               <a:t>primary or main </a:t>
             </a:r>
             <a:r>
-              <a:rPr lang="en-US" sz="3300" dirty="0">
+              <a:rPr lang="en-US" sz="3200" dirty="0">
                 <a:solidFill>
                   <a:srgbClr val="454545"/>
                 </a:solidFill>
                 <a:latin typeface="Segoe UI" panose="020B0502040204020203" pitchFamily="34" charset="0"/>
               </a:rPr>
-              <a:t>thread. A process can have multiple threads in addition to the primary thread.</a:t>
-            </a:r>
-            <a:endParaRPr lang="en-US" sz="3300" dirty="0"/>
+              <a:t>thread. </a:t>
+            </a:r>
+            <a:endParaRPr lang="en-US" sz="3200" dirty="0" smtClean="0">
+              <a:solidFill>
+                <a:srgbClr val="454545"/>
+              </a:solidFill>
+              <a:latin typeface="Segoe UI" panose="020B0502040204020203" pitchFamily="34" charset="0"/>
+            </a:endParaRPr>
+          </a:p>
+          <a:p>
+            <a:pPr marL="285750" indent="-285750">
+              <a:buFont typeface="Arial" panose="020B0604020202020204" pitchFamily="34" charset="0"/>
+              <a:buChar char="•"/>
+            </a:pPr>
+            <a:endParaRPr lang="en-US" sz="3200" dirty="0">
+              <a:solidFill>
+                <a:srgbClr val="454545"/>
+              </a:solidFill>
+              <a:latin typeface="Segoe UI" panose="020B0502040204020203" pitchFamily="34" charset="0"/>
+            </a:endParaRPr>
+          </a:p>
+          <a:p>
+            <a:pPr marL="285750" indent="-285750">
+              <a:buFont typeface="Arial" panose="020B0604020202020204" pitchFamily="34" charset="0"/>
+              <a:buChar char="•"/>
+            </a:pPr>
+            <a:r>
+              <a:rPr lang="en-US" sz="3200" dirty="0" smtClean="0">
+                <a:solidFill>
+                  <a:srgbClr val="454545"/>
+                </a:solidFill>
+                <a:latin typeface="Segoe UI" panose="020B0502040204020203" pitchFamily="34" charset="0"/>
+              </a:rPr>
+              <a:t>A </a:t>
+            </a:r>
+            <a:r>
+              <a:rPr lang="en-US" sz="3200" dirty="0">
+                <a:solidFill>
+                  <a:srgbClr val="454545"/>
+                </a:solidFill>
+                <a:latin typeface="Segoe UI" panose="020B0502040204020203" pitchFamily="34" charset="0"/>
+              </a:rPr>
+              <a:t>process can have multiple threads in addition to the primary thread.</a:t>
+            </a:r>
+            <a:endParaRPr lang="en-US" sz="3200" dirty="0"/>
           </a:p>
         </p:txBody>
       </p:sp>
@@ -4840,7 +4964,6 @@
               <a:rPr lang="en-US" sz="3300" dirty="0"/>
               <a:t>thread in a process shares that process's global variables and resources.</a:t>
             </a:r>
-            <a:endParaRPr lang="en-US" sz="3300" dirty="0"/>
           </a:p>
         </p:txBody>
       </p:sp>
@@ -5344,8 +5467,16 @@
               <a:buChar char="•"/>
             </a:pPr>
             <a:r>
+              <a:rPr lang="en-US" dirty="0"/>
+              <a:t>P</a:t>
+            </a:r>
+            <a:r>
               <a:rPr lang="en-US" dirty="0" smtClean="0"/>
-              <a:t>Normally performance is the goal.</a:t>
+              <a:t>erformance </a:t>
+            </a:r>
+            <a:r>
+              <a:rPr lang="en-US" dirty="0" smtClean="0"/>
+              <a:t>is the goal.</a:t>
             </a:r>
             <a:endParaRPr lang="en-US" dirty="0"/>
           </a:p>

</xml_diff>